<commit_message>
Powerpoint week 1 bewerkt.
</commit_message>
<xml_diff>
--- a/Week1/Week 1 - Partitions.pptx
+++ b/Week1/Week 1 - Partitions.pptx
@@ -195,7 +195,7 @@
           <a:p>
             <a:fld id="{E62C35BB-CE26-44D7-B5D9-25A8FB5F8715}" type="datetimeFigureOut">
               <a:rPr lang="nl-NL" smtClean="0"/>
-              <a:t>12-11-2015</a:t>
+              <a:t>17-11-2015</a:t>
             </a:fld>
             <a:endParaRPr lang="nl-NL"/>
           </a:p>
@@ -1195,7 +1195,7 @@
           <a:p>
             <a:fld id="{92CFB954-93AE-443C-9105-0400A69CD1D8}" type="datetimeFigureOut">
               <a:rPr lang="nl-NL" smtClean="0"/>
-              <a:t>12-11-2015</a:t>
+              <a:t>17-11-2015</a:t>
             </a:fld>
             <a:endParaRPr lang="nl-NL"/>
           </a:p>
@@ -1391,7 +1391,7 @@
           <a:p>
             <a:fld id="{92CFB954-93AE-443C-9105-0400A69CD1D8}" type="datetimeFigureOut">
               <a:rPr lang="nl-NL" smtClean="0"/>
-              <a:t>12-11-2015</a:t>
+              <a:t>17-11-2015</a:t>
             </a:fld>
             <a:endParaRPr lang="nl-NL"/>
           </a:p>
@@ -1576,7 +1576,7 @@
           <a:p>
             <a:fld id="{92CFB954-93AE-443C-9105-0400A69CD1D8}" type="datetimeFigureOut">
               <a:rPr lang="nl-NL" smtClean="0"/>
-              <a:t>12-11-2015</a:t>
+              <a:t>17-11-2015</a:t>
             </a:fld>
             <a:endParaRPr lang="nl-NL"/>
           </a:p>
@@ -1726,7 +1726,7 @@
           <a:p>
             <a:fld id="{92CFB954-93AE-443C-9105-0400A69CD1D8}" type="datetimeFigureOut">
               <a:rPr lang="nl-NL" smtClean="0"/>
-              <a:t>12-11-2015</a:t>
+              <a:t>17-11-2015</a:t>
             </a:fld>
             <a:endParaRPr lang="nl-NL"/>
           </a:p>
@@ -1981,7 +1981,7 @@
           <a:p>
             <a:fld id="{92CFB954-93AE-443C-9105-0400A69CD1D8}" type="datetimeFigureOut">
               <a:rPr lang="nl-NL" smtClean="0"/>
-              <a:t>12-11-2015</a:t>
+              <a:t>17-11-2015</a:t>
             </a:fld>
             <a:endParaRPr lang="nl-NL"/>
           </a:p>
@@ -2390,7 +2390,7 @@
           <a:p>
             <a:fld id="{92CFB954-93AE-443C-9105-0400A69CD1D8}" type="datetimeFigureOut">
               <a:rPr lang="nl-NL" smtClean="0"/>
-              <a:t>12-11-2015</a:t>
+              <a:t>17-11-2015</a:t>
             </a:fld>
             <a:endParaRPr lang="nl-NL"/>
           </a:p>
@@ -2836,7 +2836,7 @@
           <a:p>
             <a:fld id="{92CFB954-93AE-443C-9105-0400A69CD1D8}" type="datetimeFigureOut">
               <a:rPr lang="nl-NL" smtClean="0"/>
-              <a:t>12-11-2015</a:t>
+              <a:t>17-11-2015</a:t>
             </a:fld>
             <a:endParaRPr lang="nl-NL"/>
           </a:p>
@@ -2937,7 +2937,7 @@
           <a:p>
             <a:fld id="{92CFB954-93AE-443C-9105-0400A69CD1D8}" type="datetimeFigureOut">
               <a:rPr lang="nl-NL" smtClean="0"/>
-              <a:t>12-11-2015</a:t>
+              <a:t>17-11-2015</a:t>
             </a:fld>
             <a:endParaRPr lang="nl-NL"/>
           </a:p>
@@ -3058,7 +3058,7 @@
           <a:p>
             <a:fld id="{92CFB954-93AE-443C-9105-0400A69CD1D8}" type="datetimeFigureOut">
               <a:rPr lang="nl-NL" smtClean="0"/>
-              <a:t>12-11-2015</a:t>
+              <a:t>17-11-2015</a:t>
             </a:fld>
             <a:endParaRPr lang="nl-NL"/>
           </a:p>
@@ -3332,7 +3332,7 @@
           <a:p>
             <a:fld id="{92CFB954-93AE-443C-9105-0400A69CD1D8}" type="datetimeFigureOut">
               <a:rPr lang="nl-NL" smtClean="0"/>
-              <a:t>12-11-2015</a:t>
+              <a:t>17-11-2015</a:t>
             </a:fld>
             <a:endParaRPr lang="nl-NL"/>
           </a:p>
@@ -3537,7 +3537,7 @@
           <a:p>
             <a:fld id="{92CFB954-93AE-443C-9105-0400A69CD1D8}" type="datetimeFigureOut">
               <a:rPr lang="nl-NL" smtClean="0"/>
-              <a:t>12-11-2015</a:t>
+              <a:t>17-11-2015</a:t>
             </a:fld>
             <a:endParaRPr lang="nl-NL"/>
           </a:p>
@@ -4646,7 +4646,7 @@
           <a:p>
             <a:fld id="{92CFB954-93AE-443C-9105-0400A69CD1D8}" type="datetimeFigureOut">
               <a:rPr lang="nl-NL" smtClean="0"/>
-              <a:t>12-11-2015</a:t>
+              <a:t>17-11-2015</a:t>
             </a:fld>
             <a:endParaRPr lang="nl-NL"/>
           </a:p>
@@ -5103,11 +5103,7 @@
           <a:p>
             <a:r>
               <a:rPr lang="nl-NL" dirty="0" smtClean="0"/>
-              <a:t>Bas van Summeren, </a:t>
-            </a:r>
-            <a:r>
-              <a:rPr lang="nl-NL" dirty="0" smtClean="0"/>
-              <a:t>479334</a:t>
+              <a:t>Bas van Summeren, 479334</a:t>
             </a:r>
             <a:endParaRPr lang="nl-NL" dirty="0"/>
           </a:p>
@@ -5123,6 +5119,13 @@
   <p:clrMapOvr>
     <a:masterClrMapping/>
   </p:clrMapOvr>
+  <p:timing>
+    <p:tnLst>
+      <p:par>
+        <p:cTn id="1" dur="indefinite" restart="never" nodeType="tmRoot"/>
+      </p:par>
+    </p:tnLst>
+  </p:timing>
 </p:sld>
 </file>
 
@@ -5316,6 +5319,13 @@
   <p:clrMapOvr>
     <a:masterClrMapping/>
   </p:clrMapOvr>
+  <p:timing>
+    <p:tnLst>
+      <p:par>
+        <p:cTn id="1" dur="indefinite" restart="never" nodeType="tmRoot"/>
+      </p:par>
+    </p:tnLst>
+  </p:timing>
 </p:sld>
 </file>
 
@@ -5363,13 +5373,17 @@
           <a:p>
             <a:r>
               <a:rPr lang="nl-NL" dirty="0" smtClean="0"/>
-              <a:t>Patroon gezocht en gevonden</a:t>
-            </a:r>
-          </a:p>
-          <a:p>
+              <a:t>Patroon gezocht en </a:t>
+            </a:r>
             <a:r>
               <a:rPr lang="nl-NL" dirty="0" smtClean="0"/>
-              <a:t>Patroon gerealiseerd</a:t>
+              <a:t>gevonden</a:t>
+            </a:r>
+          </a:p>
+          <a:p>
+            <a:r>
+              <a:rPr lang="nl-NL" dirty="0" smtClean="0"/>
+              <a:t>Dubbele waarden voorkomen</a:t>
             </a:r>
             <a:endParaRPr lang="nl-NL" dirty="0"/>
           </a:p>
@@ -5408,6 +5422,13 @@
   <p:clrMapOvr>
     <a:masterClrMapping/>
   </p:clrMapOvr>
+  <p:timing>
+    <p:tnLst>
+      <p:par>
+        <p:cTn id="1" dur="indefinite" restart="never" nodeType="tmRoot"/>
+      </p:par>
+    </p:tnLst>
+  </p:timing>
 </p:sld>
 </file>
 
@@ -5880,6 +5901,47 @@
           </a:p>
         </p:txBody>
       </p:sp>
+      <p:sp>
+        <p:nvSpPr>
+          <p:cNvPr id="2" name="Rechthoek 1"/>
+          <p:cNvSpPr/>
+          <p:nvPr/>
+        </p:nvSpPr>
+        <p:spPr>
+          <a:xfrm>
+            <a:off x="1043608" y="4509120"/>
+            <a:ext cx="6552728" cy="1296144"/>
+          </a:xfrm>
+          <a:prstGeom prst="rect">
+            <a:avLst/>
+          </a:prstGeom>
+          <a:noFill/>
+        </p:spPr>
+        <p:style>
+          <a:lnRef idx="2">
+            <a:schemeClr val="accent1">
+              <a:shade val="50000"/>
+            </a:schemeClr>
+          </a:lnRef>
+          <a:fillRef idx="1">
+            <a:schemeClr val="accent1"/>
+          </a:fillRef>
+          <a:effectRef idx="0">
+            <a:schemeClr val="accent1"/>
+          </a:effectRef>
+          <a:fontRef idx="minor">
+            <a:schemeClr val="lt1"/>
+          </a:fontRef>
+        </p:style>
+        <p:txBody>
+          <a:bodyPr rtlCol="0" anchor="ctr"/>
+          <a:lstStyle/>
+          <a:p>
+            <a:pPr algn="ctr"/>
+            <a:endParaRPr lang="nl-NL"/>
+          </a:p>
+        </p:txBody>
+      </p:sp>
     </p:spTree>
     <p:extLst>
       <p:ext uri="{BB962C8B-B14F-4D97-AF65-F5344CB8AC3E}">
@@ -5890,6 +5952,13 @@
   <p:clrMapOvr>
     <a:masterClrMapping/>
   </p:clrMapOvr>
+  <p:timing>
+    <p:tnLst>
+      <p:par>
+        <p:cTn id="1" dur="indefinite" restart="never" nodeType="tmRoot"/>
+      </p:par>
+    </p:tnLst>
+  </p:timing>
 </p:sld>
 </file>
 

</xml_diff>